<commit_message>
multiple linear regression duzenlendi
</commit_message>
<xml_diff>
--- a/presentations/04_Çoklu_Regresyon++.pptx
+++ b/presentations/04_Çoklu_Regresyon++.pptx
@@ -363,6 +363,30 @@
             <pc:docMk/>
             <pc:sldMk cId="3243666513" sldId="283"/>
             <ac:spMk id="4" creationId="{99634361-EE2F-4C4E-A633-0E2B199DA278}"/>
+          </ac:spMkLst>
+        </pc:spChg>
+      </pc:sldChg>
+    </pc:docChg>
+  </pc:docChgLst>
+  <pc:docChgLst>
+    <pc:chgData name="Erkan ŞİRİN" userId="7f10ce1d6aaf8c5d" providerId="LiveId" clId="{46D8FF4D-47BA-4BDC-9D0E-89980620B548}"/>
+    <pc:docChg chg="modSld">
+      <pc:chgData name="Erkan ŞİRİN" userId="7f10ce1d6aaf8c5d" providerId="LiveId" clId="{46D8FF4D-47BA-4BDC-9D0E-89980620B548}" dt="2019-05-30T19:08:46.677" v="40" actId="20577"/>
+      <pc:docMkLst>
+        <pc:docMk/>
+      </pc:docMkLst>
+      <pc:sldChg chg="modSp">
+        <pc:chgData name="Erkan ŞİRİN" userId="7f10ce1d6aaf8c5d" providerId="LiveId" clId="{46D8FF4D-47BA-4BDC-9D0E-89980620B548}" dt="2019-05-30T19:08:46.677" v="40" actId="20577"/>
+        <pc:sldMkLst>
+          <pc:docMk/>
+          <pc:sldMk cId="3773428193" sldId="271"/>
+        </pc:sldMkLst>
+        <pc:spChg chg="mod">
+          <ac:chgData name="Erkan ŞİRİN" userId="7f10ce1d6aaf8c5d" providerId="LiveId" clId="{46D8FF4D-47BA-4BDC-9D0E-89980620B548}" dt="2019-05-30T19:08:46.677" v="40" actId="20577"/>
+          <ac:spMkLst>
+            <pc:docMk/>
+            <pc:sldMk cId="3773428193" sldId="271"/>
+            <ac:spMk id="18" creationId="{7663CACF-D02B-44E7-81EC-6A34B6B33A71}"/>
           </ac:spMkLst>
         </pc:spChg>
       </pc:sldChg>
@@ -15964,7 +15988,7 @@
         <p:spPr>
           <a:xfrm>
             <a:off x="3325002" y="4492526"/>
-            <a:ext cx="4561698" cy="492443"/>
+            <a:ext cx="6580648" cy="892552"/>
           </a:xfrm>
           <a:prstGeom prst="rect">
             <a:avLst/>
@@ -15975,6 +15999,17 @@
             <a:spAutoFit/>
           </a:bodyPr>
           <a:lstStyle/>
+          <a:p>
+            <a:r>
+              <a:rPr lang="tr-TR" sz="2600" b="1" dirty="0">
+                <a:solidFill>
+                  <a:srgbClr val="0070C0"/>
+                </a:solidFill>
+                <a:latin typeface="Roboto"/>
+              </a:rPr>
+              <a:t>Bazı kütüphanelerde (örneğin Spark ML)</a:t>
+            </a:r>
+          </a:p>
           <a:p>
             <a:r>
               <a:rPr lang="tr-TR" sz="2600" b="1" dirty="0" err="1">

</xml_diff>